<commit_message>
Added photos and finished powerpoint
</commit_message>
<xml_diff>
--- a/problem_formulation.pptx
+++ b/problem_formulation.pptx
@@ -4633,6 +4633,14 @@
 <file path=ppt/slides/slide2.xml><?xml version="1.0" encoding="utf-8"?>
 <p:sld xmlns:a="http://schemas.openxmlformats.org/drawingml/2006/main" xmlns:r="http://schemas.openxmlformats.org/officeDocument/2006/relationships" xmlns:p="http://schemas.openxmlformats.org/presentationml/2006/main">
   <p:cSld>
+    <p:bg>
+      <p:bgPr>
+        <a:solidFill>
+          <a:schemeClr val="bg2"/>
+        </a:solidFill>
+        <a:effectLst/>
+      </p:bgPr>
+    </p:bg>
     <p:spTree>
       <p:nvGrpSpPr>
         <p:cNvPr id="1" name=""/>
@@ -4649,6 +4657,130 @@
       </p:grpSpPr>
       <p:sp>
         <p:nvSpPr>
+          <p:cNvPr id="10" name="Rectangle 9">
+            <a:extLst>
+              <a:ext uri="{FF2B5EF4-FFF2-40B4-BE49-F238E27FC236}">
+                <a16:creationId xmlns:a16="http://schemas.microsoft.com/office/drawing/2014/main" id="{1BB56EB9-078F-4952-AC1F-149C7A0AE4D5}"/>
+              </a:ext>
+              <a:ext uri="{C183D7F6-B498-43B3-948B-1728B52AA6E4}">
+                <adec:decorative xmlns:adec="http://schemas.microsoft.com/office/drawing/2017/decorative" val="1"/>
+              </a:ext>
+            </a:extLst>
+          </p:cNvPr>
+          <p:cNvSpPr>
+            <a:spLocks noGrp="1" noRot="1" noChangeAspect="1" noMove="1" noResize="1" noEditPoints="1" noAdjustHandles="1" noChangeArrowheads="1" noChangeShapeType="1" noTextEdit="1"/>
+          </p:cNvSpPr>
+          <p:nvPr>
+            <p:extLst>
+              <p:ext uri="{386F3935-93C4-4BCD-93E2-E3B085C9AB24}">
+                <p16:designElem xmlns:p16="http://schemas.microsoft.com/office/powerpoint/2015/main" val="1"/>
+              </p:ext>
+            </p:extLst>
+          </p:nvPr>
+        </p:nvSpPr>
+        <p:spPr>
+          <a:xfrm>
+            <a:off x="0" y="0"/>
+            <a:ext cx="12192000" cy="6858000"/>
+          </a:xfrm>
+          <a:prstGeom prst="rect">
+            <a:avLst/>
+          </a:prstGeom>
+          <a:solidFill>
+            <a:schemeClr val="tx1"/>
+          </a:solidFill>
+          <a:ln>
+            <a:noFill/>
+          </a:ln>
+        </p:spPr>
+        <p:style>
+          <a:lnRef idx="2">
+            <a:schemeClr val="accent1">
+              <a:shade val="50000"/>
+            </a:schemeClr>
+          </a:lnRef>
+          <a:fillRef idx="1">
+            <a:schemeClr val="accent1"/>
+          </a:fillRef>
+          <a:effectRef idx="0">
+            <a:schemeClr val="accent1"/>
+          </a:effectRef>
+          <a:fontRef idx="minor">
+            <a:schemeClr val="lt1"/>
+          </a:fontRef>
+        </p:style>
+        <p:txBody>
+          <a:bodyPr rtlCol="0" anchor="ctr"/>
+          <a:lstStyle/>
+          <a:p>
+            <a:pPr algn="ctr"/>
+            <a:endParaRPr lang="en-US"/>
+          </a:p>
+        </p:txBody>
+      </p:sp>
+      <p:sp>
+        <p:nvSpPr>
+          <p:cNvPr id="12" name="Rectangle 11">
+            <a:extLst>
+              <a:ext uri="{FF2B5EF4-FFF2-40B4-BE49-F238E27FC236}">
+                <a16:creationId xmlns:a16="http://schemas.microsoft.com/office/drawing/2014/main" id="{D3772EE4-ED5E-4D3A-A306-B22CF866786D}"/>
+              </a:ext>
+              <a:ext uri="{C183D7F6-B498-43B3-948B-1728B52AA6E4}">
+                <adec:decorative xmlns:adec="http://schemas.microsoft.com/office/drawing/2017/decorative" val="1"/>
+              </a:ext>
+            </a:extLst>
+          </p:cNvPr>
+          <p:cNvSpPr>
+            <a:spLocks noGrp="1" noRot="1" noChangeAspect="1" noMove="1" noResize="1" noEditPoints="1" noAdjustHandles="1" noChangeArrowheads="1" noChangeShapeType="1" noTextEdit="1"/>
+          </p:cNvSpPr>
+          <p:nvPr>
+            <p:extLst>
+              <p:ext uri="{386F3935-93C4-4BCD-93E2-E3B085C9AB24}">
+                <p16:designElem xmlns:p16="http://schemas.microsoft.com/office/powerpoint/2015/main" val="1"/>
+              </p:ext>
+            </p:extLst>
+          </p:nvPr>
+        </p:nvSpPr>
+        <p:spPr>
+          <a:xfrm>
+            <a:off x="446534" y="601200"/>
+            <a:ext cx="3703320" cy="5789365"/>
+          </a:xfrm>
+          <a:prstGeom prst="rect">
+            <a:avLst/>
+          </a:prstGeom>
+          <a:solidFill>
+            <a:srgbClr val="465359"/>
+          </a:solidFill>
+          <a:ln>
+            <a:noFill/>
+          </a:ln>
+          <a:effectLst/>
+        </p:spPr>
+        <p:style>
+          <a:lnRef idx="1">
+            <a:schemeClr val="accent1"/>
+          </a:lnRef>
+          <a:fillRef idx="3">
+            <a:schemeClr val="accent1"/>
+          </a:fillRef>
+          <a:effectRef idx="2">
+            <a:schemeClr val="accent1"/>
+          </a:effectRef>
+          <a:fontRef idx="minor">
+            <a:schemeClr val="lt1"/>
+          </a:fontRef>
+        </p:style>
+        <p:txBody>
+          <a:bodyPr/>
+          <a:lstStyle/>
+          <a:p>
+            <a:endParaRPr lang="en-CA"/>
+          </a:p>
+        </p:txBody>
+      </p:sp>
+      <p:sp>
+        <p:nvSpPr>
           <p:cNvPr id="2" name="Title 1">
             <a:extLst>
               <a:ext uri="{FF2B5EF4-FFF2-40B4-BE49-F238E27FC236}">
@@ -4663,16 +4795,214 @@
             <p:ph type="title"/>
           </p:nvPr>
         </p:nvSpPr>
-        <p:spPr/>
+        <p:spPr>
+          <a:xfrm>
+            <a:off x="672280" y="944752"/>
+            <a:ext cx="3259016" cy="1462692"/>
+          </a:xfrm>
+        </p:spPr>
+        <p:txBody>
+          <a:bodyPr>
+            <a:normAutofit/>
+          </a:bodyPr>
+          <a:lstStyle/>
+          <a:p>
+            <a:r>
+              <a:rPr lang="en-US">
+                <a:solidFill>
+                  <a:srgbClr val="FFFFFF"/>
+                </a:solidFill>
+              </a:rPr>
+              <a:t>Summary</a:t>
+            </a:r>
+            <a:endParaRPr lang="en-CA">
+              <a:solidFill>
+                <a:srgbClr val="FFFFFF"/>
+              </a:solidFill>
+            </a:endParaRPr>
+          </a:p>
+        </p:txBody>
+      </p:sp>
+      <p:sp>
+        <p:nvSpPr>
+          <p:cNvPr id="14" name="Rectangle 13">
+            <a:extLst>
+              <a:ext uri="{FF2B5EF4-FFF2-40B4-BE49-F238E27FC236}">
+                <a16:creationId xmlns:a16="http://schemas.microsoft.com/office/drawing/2014/main" id="{10058680-D07C-4893-B2B7-91543F18AB32}"/>
+              </a:ext>
+              <a:ext uri="{C183D7F6-B498-43B3-948B-1728B52AA6E4}">
+                <adec:decorative xmlns:adec="http://schemas.microsoft.com/office/drawing/2017/decorative" val="1"/>
+              </a:ext>
+            </a:extLst>
+          </p:cNvPr>
+          <p:cNvSpPr>
+            <a:spLocks noGrp="1" noRot="1" noChangeAspect="1" noMove="1" noResize="1" noEditPoints="1" noAdjustHandles="1" noChangeArrowheads="1" noChangeShapeType="1" noTextEdit="1"/>
+          </p:cNvSpPr>
+          <p:nvPr>
+            <p:extLst>
+              <p:ext uri="{386F3935-93C4-4BCD-93E2-E3B085C9AB24}">
+                <p16:designElem xmlns:p16="http://schemas.microsoft.com/office/powerpoint/2015/main" val="1"/>
+              </p:ext>
+            </p:extLst>
+          </p:nvPr>
+        </p:nvSpPr>
+        <p:spPr>
+          <a:xfrm>
+            <a:off x="446534" y="457200"/>
+            <a:ext cx="3703320" cy="94997"/>
+          </a:xfrm>
+          <a:prstGeom prst="rect">
+            <a:avLst/>
+          </a:prstGeom>
+          <a:solidFill>
+            <a:srgbClr val="465359"/>
+          </a:solidFill>
+          <a:ln>
+            <a:noFill/>
+          </a:ln>
+          <a:effectLst/>
+        </p:spPr>
+        <p:style>
+          <a:lnRef idx="1">
+            <a:schemeClr val="accent1"/>
+          </a:lnRef>
+          <a:fillRef idx="3">
+            <a:schemeClr val="accent1"/>
+          </a:fillRef>
+          <a:effectRef idx="2">
+            <a:schemeClr val="accent1"/>
+          </a:effectRef>
+          <a:fontRef idx="minor">
+            <a:schemeClr val="lt1"/>
+          </a:fontRef>
+        </p:style>
         <p:txBody>
           <a:bodyPr/>
           <a:lstStyle/>
           <a:p>
-            <a:r>
-              <a:rPr lang="en-US" dirty="0"/>
-              <a:t>Summary</a:t>
-            </a:r>
-            <a:endParaRPr lang="en-CA" dirty="0"/>
+            <a:endParaRPr lang="en-CA"/>
+          </a:p>
+        </p:txBody>
+      </p:sp>
+      <p:sp>
+        <p:nvSpPr>
+          <p:cNvPr id="16" name="Rectangle 15">
+            <a:extLst>
+              <a:ext uri="{FF2B5EF4-FFF2-40B4-BE49-F238E27FC236}">
+                <a16:creationId xmlns:a16="http://schemas.microsoft.com/office/drawing/2014/main" id="{7B42427A-0A1F-4A55-8705-D9179F1E0CFB}"/>
+              </a:ext>
+              <a:ext uri="{C183D7F6-B498-43B3-948B-1728B52AA6E4}">
+                <adec:decorative xmlns:adec="http://schemas.microsoft.com/office/drawing/2017/decorative" val="1"/>
+              </a:ext>
+            </a:extLst>
+          </p:cNvPr>
+          <p:cNvSpPr>
+            <a:spLocks noGrp="1" noRot="1" noChangeAspect="1" noMove="1" noResize="1" noEditPoints="1" noAdjustHandles="1" noChangeArrowheads="1" noChangeShapeType="1" noTextEdit="1"/>
+          </p:cNvSpPr>
+          <p:nvPr>
+            <p:extLst>
+              <p:ext uri="{386F3935-93C4-4BCD-93E2-E3B085C9AB24}">
+                <p16:designElem xmlns:p16="http://schemas.microsoft.com/office/powerpoint/2015/main" val="1"/>
+              </p:ext>
+            </p:extLst>
+          </p:nvPr>
+        </p:nvSpPr>
+        <p:spPr>
+          <a:xfrm>
+            <a:off x="4241830" y="457200"/>
+            <a:ext cx="3703320" cy="91440"/>
+          </a:xfrm>
+          <a:prstGeom prst="rect">
+            <a:avLst/>
+          </a:prstGeom>
+          <a:solidFill>
+            <a:schemeClr val="accent1"/>
+          </a:solidFill>
+          <a:ln>
+            <a:noFill/>
+          </a:ln>
+          <a:effectLst/>
+        </p:spPr>
+        <p:style>
+          <a:lnRef idx="1">
+            <a:schemeClr val="accent1"/>
+          </a:lnRef>
+          <a:fillRef idx="3">
+            <a:schemeClr val="accent1"/>
+          </a:fillRef>
+          <a:effectRef idx="2">
+            <a:schemeClr val="accent1"/>
+          </a:effectRef>
+          <a:fontRef idx="minor">
+            <a:schemeClr val="lt1"/>
+          </a:fontRef>
+        </p:style>
+        <p:txBody>
+          <a:bodyPr/>
+          <a:lstStyle/>
+          <a:p>
+            <a:endParaRPr lang="en-US" dirty="0"/>
+          </a:p>
+        </p:txBody>
+      </p:sp>
+      <p:sp>
+        <p:nvSpPr>
+          <p:cNvPr id="18" name="Rectangle 17">
+            <a:extLst>
+              <a:ext uri="{FF2B5EF4-FFF2-40B4-BE49-F238E27FC236}">
+                <a16:creationId xmlns:a16="http://schemas.microsoft.com/office/drawing/2014/main" id="{EE54A6FE-D8CB-48A3-900B-053D4EBD3B85}"/>
+              </a:ext>
+              <a:ext uri="{C183D7F6-B498-43B3-948B-1728B52AA6E4}">
+                <adec:decorative xmlns:adec="http://schemas.microsoft.com/office/drawing/2017/decorative" val="1"/>
+              </a:ext>
+            </a:extLst>
+          </p:cNvPr>
+          <p:cNvSpPr>
+            <a:spLocks noGrp="1" noRot="1" noChangeAspect="1" noMove="1" noResize="1" noEditPoints="1" noAdjustHandles="1" noChangeArrowheads="1" noChangeShapeType="1" noTextEdit="1"/>
+          </p:cNvSpPr>
+          <p:nvPr>
+            <p:extLst>
+              <p:ext uri="{386F3935-93C4-4BCD-93E2-E3B085C9AB24}">
+                <p16:designElem xmlns:p16="http://schemas.microsoft.com/office/powerpoint/2015/main" val="1"/>
+              </p:ext>
+            </p:extLst>
+          </p:nvPr>
+        </p:nvSpPr>
+        <p:spPr>
+          <a:xfrm>
+            <a:off x="8042147" y="453643"/>
+            <a:ext cx="3703320" cy="98554"/>
+          </a:xfrm>
+          <a:prstGeom prst="rect">
+            <a:avLst/>
+          </a:prstGeom>
+          <a:solidFill>
+            <a:srgbClr val="969FA7"/>
+          </a:solidFill>
+          <a:ln>
+            <a:noFill/>
+          </a:ln>
+          <a:effectLst/>
+        </p:spPr>
+        <p:style>
+          <a:lnRef idx="1">
+            <a:schemeClr val="accent1"/>
+          </a:lnRef>
+          <a:fillRef idx="3">
+            <a:schemeClr val="accent1"/>
+          </a:fillRef>
+          <a:effectRef idx="2">
+            <a:schemeClr val="accent1"/>
+          </a:effectRef>
+          <a:fontRef idx="minor">
+            <a:schemeClr val="lt1"/>
+          </a:fontRef>
+        </p:style>
+        <p:txBody>
+          <a:bodyPr/>
+          <a:lstStyle/>
+          <a:p>
+            <a:endParaRPr lang="en-CA"/>
           </a:p>
         </p:txBody>
       </p:sp>
@@ -4694,25 +5024,70 @@
         </p:nvSpPr>
         <p:spPr>
           <a:xfrm>
-            <a:off x="581193" y="2340864"/>
-            <a:ext cx="6725130" cy="3634486"/>
-          </a:xfrm>
-        </p:spPr>
-        <p:txBody>
-          <a:bodyPr/>
+            <a:off x="671513" y="2536031"/>
+            <a:ext cx="3123783" cy="3671936"/>
+          </a:xfrm>
+        </p:spPr>
+        <p:txBody>
+          <a:bodyPr anchor="t">
+            <a:normAutofit/>
+          </a:bodyPr>
           <a:lstStyle/>
           <a:p>
             <a:pPr marL="0" indent="0">
               <a:buNone/>
             </a:pPr>
             <a:r>
-              <a:rPr lang="en-US" dirty="0"/>
-              <a:t>Our project is an exploration of the techniques of artificial intelligence and its ability to be used to optimize and analyze the trading card game Magic The Gathering.  The ultimate goal is to optimize play for the purpose of streamlined feedback during games allowing new players to better understand correct lines of play. </a:t>
-            </a:r>
-            <a:endParaRPr lang="en-CA" dirty="0"/>
-          </a:p>
-        </p:txBody>
-      </p:sp>
+              <a:rPr lang="en-US" dirty="0">
+                <a:solidFill>
+                  <a:srgbClr val="FFFFFF"/>
+                </a:solidFill>
+              </a:rPr>
+              <a:t>Our project is an exploration of the techniques of artificial intelligence and its ability to be used to optimize and analyze the trading card game Magic The Gathering.  The goal is to optimize play and streamline feedback during games to allow new players to better understand correct lines of play. </a:t>
+            </a:r>
+            <a:endParaRPr lang="en-CA" dirty="0">
+              <a:solidFill>
+                <a:srgbClr val="FFFFFF"/>
+              </a:solidFill>
+            </a:endParaRPr>
+          </a:p>
+        </p:txBody>
+      </p:sp>
+      <p:pic>
+        <p:nvPicPr>
+          <p:cNvPr id="5" name="Picture 4" descr="A skeleton with a keyhole in the center&#10;&#10;Description automatically generated">
+            <a:extLst>
+              <a:ext uri="{FF2B5EF4-FFF2-40B4-BE49-F238E27FC236}">
+                <a16:creationId xmlns:a16="http://schemas.microsoft.com/office/drawing/2014/main" id="{1E7CA884-B098-797C-8447-A02CAC2BEA87}"/>
+              </a:ext>
+            </a:extLst>
+          </p:cNvPr>
+          <p:cNvPicPr>
+            <a:picLocks noChangeAspect="1"/>
+          </p:cNvPicPr>
+          <p:nvPr/>
+        </p:nvPicPr>
+        <p:blipFill rotWithShape="1">
+          <a:blip r:embed="rId2">
+            <a:extLst>
+              <a:ext uri="{28A0092B-C50C-407E-A947-70E740481C1C}">
+                <a14:useLocalDpi xmlns:a14="http://schemas.microsoft.com/office/drawing/2010/main" val="0"/>
+              </a:ext>
+            </a:extLst>
+          </a:blip>
+          <a:srcRect r="5061"/>
+          <a:stretch/>
+        </p:blipFill>
+        <p:spPr>
+          <a:xfrm>
+            <a:off x="4241830" y="601200"/>
+            <a:ext cx="7503636" cy="5789365"/>
+          </a:xfrm>
+          <a:prstGeom prst="rect">
+            <a:avLst/>
+          </a:prstGeom>
+        </p:spPr>
+      </p:pic>
     </p:spTree>
     <p:extLst>
       <p:ext uri="{BB962C8B-B14F-4D97-AF65-F5344CB8AC3E}">
@@ -4721,7 +5096,7 @@
     </p:extLst>
   </p:cSld>
   <p:clrMapOvr>
-    <a:masterClrMapping/>
+    <a:overrideClrMapping bg1="dk1" tx1="lt1" bg2="dk2" tx2="lt2" accent1="accent1" accent2="accent2" accent3="accent3" accent4="accent4" accent5="accent5" accent6="accent6" hlink="hlink" folHlink="folHlink"/>
   </p:clrMapOvr>
 </p:sld>
 </file>
@@ -4729,6 +5104,14 @@
 <file path=ppt/slides/slide3.xml><?xml version="1.0" encoding="utf-8"?>
 <p:sld xmlns:a="http://schemas.openxmlformats.org/drawingml/2006/main" xmlns:r="http://schemas.openxmlformats.org/officeDocument/2006/relationships" xmlns:p="http://schemas.openxmlformats.org/presentationml/2006/main">
   <p:cSld>
+    <p:bg>
+      <p:bgPr>
+        <a:solidFill>
+          <a:schemeClr val="bg1"/>
+        </a:solidFill>
+        <a:effectLst/>
+      </p:bgPr>
+    </p:bg>
     <p:spTree>
       <p:nvGrpSpPr>
         <p:cNvPr id="1" name=""/>
@@ -4759,9 +5142,16 @@
             <p:ph type="title"/>
           </p:nvPr>
         </p:nvSpPr>
-        <p:spPr/>
-        <p:txBody>
-          <a:bodyPr/>
+        <p:spPr>
+          <a:xfrm>
+            <a:off x="581192" y="702156"/>
+            <a:ext cx="11029616" cy="1188720"/>
+          </a:xfrm>
+        </p:spPr>
+        <p:txBody>
+          <a:bodyPr>
+            <a:normAutofit/>
+          </a:bodyPr>
           <a:lstStyle/>
           <a:p>
             <a:r>
@@ -4772,6 +5162,291 @@
           </a:p>
         </p:txBody>
       </p:sp>
+      <p:sp>
+        <p:nvSpPr>
+          <p:cNvPr id="10" name="Rectangle 9">
+            <a:extLst>
+              <a:ext uri="{FF2B5EF4-FFF2-40B4-BE49-F238E27FC236}">
+                <a16:creationId xmlns:a16="http://schemas.microsoft.com/office/drawing/2014/main" id="{7A4CA679-3546-4E14-8FB8-F57168C37635}"/>
+              </a:ext>
+              <a:ext uri="{C183D7F6-B498-43B3-948B-1728B52AA6E4}">
+                <adec:decorative xmlns:adec="http://schemas.microsoft.com/office/drawing/2017/decorative" val="1"/>
+              </a:ext>
+            </a:extLst>
+          </p:cNvPr>
+          <p:cNvSpPr>
+            <a:spLocks noGrp="1" noRot="1" noChangeAspect="1" noMove="1" noResize="1" noEditPoints="1" noAdjustHandles="1" noChangeArrowheads="1" noChangeShapeType="1" noTextEdit="1"/>
+          </p:cNvSpPr>
+          <p:nvPr>
+            <p:extLst>
+              <p:ext uri="{386F3935-93C4-4BCD-93E2-E3B085C9AB24}">
+                <p16:designElem xmlns:p16="http://schemas.microsoft.com/office/powerpoint/2015/main" val="1"/>
+              </p:ext>
+            </p:extLst>
+          </p:nvPr>
+        </p:nvSpPr>
+        <p:spPr>
+          <a:xfrm>
+            <a:off x="446534" y="457200"/>
+            <a:ext cx="3703320" cy="94997"/>
+          </a:xfrm>
+          <a:prstGeom prst="rect">
+            <a:avLst/>
+          </a:prstGeom>
+          <a:solidFill>
+            <a:srgbClr val="465359"/>
+          </a:solidFill>
+          <a:ln>
+            <a:noFill/>
+          </a:ln>
+          <a:effectLst/>
+        </p:spPr>
+        <p:style>
+          <a:lnRef idx="1">
+            <a:schemeClr val="accent1"/>
+          </a:lnRef>
+          <a:fillRef idx="3">
+            <a:schemeClr val="accent1"/>
+          </a:fillRef>
+          <a:effectRef idx="2">
+            <a:schemeClr val="accent1"/>
+          </a:effectRef>
+          <a:fontRef idx="minor">
+            <a:schemeClr val="lt1"/>
+          </a:fontRef>
+        </p:style>
+        <p:txBody>
+          <a:bodyPr/>
+          <a:lstStyle/>
+          <a:p>
+            <a:endParaRPr lang="en-CA"/>
+          </a:p>
+        </p:txBody>
+      </p:sp>
+      <p:sp>
+        <p:nvSpPr>
+          <p:cNvPr id="12" name="Rectangle 11">
+            <a:extLst>
+              <a:ext uri="{FF2B5EF4-FFF2-40B4-BE49-F238E27FC236}">
+                <a16:creationId xmlns:a16="http://schemas.microsoft.com/office/drawing/2014/main" id="{44D16E90-7C64-4C04-A50A-B866A1A92B4E}"/>
+              </a:ext>
+              <a:ext uri="{C183D7F6-B498-43B3-948B-1728B52AA6E4}">
+                <adec:decorative xmlns:adec="http://schemas.microsoft.com/office/drawing/2017/decorative" val="1"/>
+              </a:ext>
+            </a:extLst>
+          </p:cNvPr>
+          <p:cNvSpPr>
+            <a:spLocks noGrp="1" noRot="1" noChangeAspect="1" noMove="1" noResize="1" noEditPoints="1" noAdjustHandles="1" noChangeArrowheads="1" noChangeShapeType="1" noTextEdit="1"/>
+          </p:cNvSpPr>
+          <p:nvPr>
+            <p:extLst>
+              <p:ext uri="{386F3935-93C4-4BCD-93E2-E3B085C9AB24}">
+                <p16:designElem xmlns:p16="http://schemas.microsoft.com/office/powerpoint/2015/main" val="1"/>
+              </p:ext>
+            </p:extLst>
+          </p:nvPr>
+        </p:nvSpPr>
+        <p:spPr>
+          <a:xfrm>
+            <a:off x="4241830" y="457200"/>
+            <a:ext cx="3703320" cy="91440"/>
+          </a:xfrm>
+          <a:prstGeom prst="rect">
+            <a:avLst/>
+          </a:prstGeom>
+          <a:solidFill>
+            <a:schemeClr val="accent1"/>
+          </a:solidFill>
+          <a:ln>
+            <a:noFill/>
+          </a:ln>
+          <a:effectLst/>
+        </p:spPr>
+        <p:style>
+          <a:lnRef idx="1">
+            <a:schemeClr val="accent1"/>
+          </a:lnRef>
+          <a:fillRef idx="3">
+            <a:schemeClr val="accent1"/>
+          </a:fillRef>
+          <a:effectRef idx="2">
+            <a:schemeClr val="accent1"/>
+          </a:effectRef>
+          <a:fontRef idx="minor">
+            <a:schemeClr val="lt1"/>
+          </a:fontRef>
+        </p:style>
+        <p:txBody>
+          <a:bodyPr/>
+          <a:lstStyle/>
+          <a:p>
+            <a:endParaRPr lang="en-CA"/>
+          </a:p>
+        </p:txBody>
+      </p:sp>
+      <p:sp>
+        <p:nvSpPr>
+          <p:cNvPr id="14" name="Rectangle 13">
+            <a:extLst>
+              <a:ext uri="{FF2B5EF4-FFF2-40B4-BE49-F238E27FC236}">
+                <a16:creationId xmlns:a16="http://schemas.microsoft.com/office/drawing/2014/main" id="{DBE4DD59-5AA2-46C6-B6A8-9B4C62D19877}"/>
+              </a:ext>
+              <a:ext uri="{C183D7F6-B498-43B3-948B-1728B52AA6E4}">
+                <adec:decorative xmlns:adec="http://schemas.microsoft.com/office/drawing/2017/decorative" val="1"/>
+              </a:ext>
+            </a:extLst>
+          </p:cNvPr>
+          <p:cNvSpPr>
+            <a:spLocks noGrp="1" noRot="1" noChangeAspect="1" noMove="1" noResize="1" noEditPoints="1" noAdjustHandles="1" noChangeArrowheads="1" noChangeShapeType="1" noTextEdit="1"/>
+          </p:cNvSpPr>
+          <p:nvPr>
+            <p:extLst>
+              <p:ext uri="{386F3935-93C4-4BCD-93E2-E3B085C9AB24}">
+                <p16:designElem xmlns:p16="http://schemas.microsoft.com/office/powerpoint/2015/main" val="1"/>
+              </p:ext>
+            </p:extLst>
+          </p:nvPr>
+        </p:nvSpPr>
+        <p:spPr>
+          <a:xfrm>
+            <a:off x="8042147" y="453643"/>
+            <a:ext cx="3703320" cy="98554"/>
+          </a:xfrm>
+          <a:prstGeom prst="rect">
+            <a:avLst/>
+          </a:prstGeom>
+          <a:solidFill>
+            <a:srgbClr val="969FA7"/>
+          </a:solidFill>
+          <a:ln>
+            <a:noFill/>
+          </a:ln>
+          <a:effectLst/>
+        </p:spPr>
+        <p:style>
+          <a:lnRef idx="1">
+            <a:schemeClr val="accent1"/>
+          </a:lnRef>
+          <a:fillRef idx="3">
+            <a:schemeClr val="accent1"/>
+          </a:fillRef>
+          <a:effectRef idx="2">
+            <a:schemeClr val="accent1"/>
+          </a:effectRef>
+          <a:fontRef idx="minor">
+            <a:schemeClr val="lt1"/>
+          </a:fontRef>
+        </p:style>
+        <p:txBody>
+          <a:bodyPr/>
+          <a:lstStyle/>
+          <a:p>
+            <a:endParaRPr lang="en-CA"/>
+          </a:p>
+        </p:txBody>
+      </p:sp>
+      <p:sp>
+        <p:nvSpPr>
+          <p:cNvPr id="16" name="Rectangle 15">
+            <a:extLst>
+              <a:ext uri="{FF2B5EF4-FFF2-40B4-BE49-F238E27FC236}">
+                <a16:creationId xmlns:a16="http://schemas.microsoft.com/office/drawing/2014/main" id="{160CE81C-67DC-489E-BFFB-877C80B854DB}"/>
+              </a:ext>
+              <a:ext uri="{C183D7F6-B498-43B3-948B-1728B52AA6E4}">
+                <adec:decorative xmlns:adec="http://schemas.microsoft.com/office/drawing/2017/decorative" val="1"/>
+              </a:ext>
+            </a:extLst>
+          </p:cNvPr>
+          <p:cNvSpPr>
+            <a:spLocks noGrp="1" noRot="1" noChangeAspect="1" noMove="1" noResize="1" noEditPoints="1" noAdjustHandles="1" noChangeArrowheads="1" noChangeShapeType="1" noTextEdit="1"/>
+          </p:cNvSpPr>
+          <p:nvPr>
+            <p:extLst>
+              <p:ext uri="{386F3935-93C4-4BCD-93E2-E3B085C9AB24}">
+                <p16:designElem xmlns:p16="http://schemas.microsoft.com/office/powerpoint/2015/main" val="1"/>
+              </p:ext>
+            </p:extLst>
+          </p:nvPr>
+        </p:nvSpPr>
+        <p:spPr>
+          <a:xfrm>
+            <a:off x="446533" y="2180496"/>
+            <a:ext cx="5404639" cy="4045683"/>
+          </a:xfrm>
+          <a:prstGeom prst="rect">
+            <a:avLst/>
+          </a:prstGeom>
+          <a:solidFill>
+            <a:srgbClr val="FFFFFF">
+              <a:alpha val="80000"/>
+            </a:srgbClr>
+          </a:solidFill>
+          <a:ln w="38100">
+            <a:solidFill>
+              <a:srgbClr val="465359"/>
+            </a:solidFill>
+          </a:ln>
+        </p:spPr>
+        <p:style>
+          <a:lnRef idx="2">
+            <a:schemeClr val="accent1">
+              <a:shade val="50000"/>
+            </a:schemeClr>
+          </a:lnRef>
+          <a:fillRef idx="1">
+            <a:schemeClr val="accent1"/>
+          </a:fillRef>
+          <a:effectRef idx="0">
+            <a:schemeClr val="accent1"/>
+          </a:effectRef>
+          <a:fontRef idx="minor">
+            <a:schemeClr val="lt1"/>
+          </a:fontRef>
+        </p:style>
+        <p:txBody>
+          <a:bodyPr rtlCol="0" anchor="ctr"/>
+          <a:lstStyle/>
+          <a:p>
+            <a:pPr algn="ctr"/>
+            <a:endParaRPr lang="en-US"/>
+          </a:p>
+        </p:txBody>
+      </p:sp>
+      <p:pic>
+        <p:nvPicPr>
+          <p:cNvPr id="5" name="Picture 4" descr="A network of dots and lines&#10;&#10;Description automatically generated">
+            <a:extLst>
+              <a:ext uri="{FF2B5EF4-FFF2-40B4-BE49-F238E27FC236}">
+                <a16:creationId xmlns:a16="http://schemas.microsoft.com/office/drawing/2014/main" id="{2829A16F-0CFC-CB18-8264-355B925F1BE8}"/>
+              </a:ext>
+            </a:extLst>
+          </p:cNvPr>
+          <p:cNvPicPr>
+            <a:picLocks noChangeAspect="1"/>
+          </p:cNvPicPr>
+          <p:nvPr/>
+        </p:nvPicPr>
+        <p:blipFill rotWithShape="1">
+          <a:blip r:embed="rId2">
+            <a:extLst>
+              <a:ext uri="{28A0092B-C50C-407E-A947-70E740481C1C}">
+                <a14:useLocalDpi xmlns:a14="http://schemas.microsoft.com/office/drawing/2010/main" val="0"/>
+              </a:ext>
+            </a:extLst>
+          </a:blip>
+          <a:srcRect l="8611" r="23038" b="-2"/>
+          <a:stretch/>
+        </p:blipFill>
+        <p:spPr>
+          <a:xfrm>
+            <a:off x="611392" y="2347105"/>
+            <a:ext cx="5074920" cy="3712464"/>
+          </a:xfrm>
+          <a:prstGeom prst="rect">
+            <a:avLst/>
+          </a:prstGeom>
+        </p:spPr>
+      </p:pic>
       <p:sp>
         <p:nvSpPr>
           <p:cNvPr id="3" name="Content Placeholder 2">
@@ -4788,115 +5463,135 @@
             <p:ph idx="1"/>
           </p:nvPr>
         </p:nvSpPr>
-        <p:spPr/>
+        <p:spPr>
+          <a:xfrm>
+            <a:off x="6340830" y="2340864"/>
+            <a:ext cx="5269977" cy="3634486"/>
+          </a:xfrm>
+        </p:spPr>
         <p:txBody>
           <a:bodyPr>
-            <a:normAutofit/>
+            <a:normAutofit lnSpcReduction="10000"/>
           </a:bodyPr>
           <a:lstStyle/>
           <a:p>
-            <a:r>
-              <a:rPr lang="en-US" dirty="0"/>
+            <a:pPr>
+              <a:lnSpc>
+                <a:spcPct val="100000"/>
+              </a:lnSpc>
+            </a:pPr>
+            <a:r>
+              <a:rPr lang="en-US" sz="1500" dirty="0"/>
               <a:t>What is the most optimal sequence of moves that will result in a winning outcome?</a:t>
             </a:r>
           </a:p>
           <a:p>
-            <a:r>
-              <a:rPr lang="en-US" dirty="0"/>
+            <a:pPr>
+              <a:lnSpc>
+                <a:spcPct val="100000"/>
+              </a:lnSpc>
+            </a:pPr>
+            <a:r>
+              <a:rPr lang="en-US" sz="1500" dirty="0"/>
               <a:t>Incredibly Large Branching Factor </a:t>
             </a:r>
           </a:p>
           <a:p>
-            <a:pPr lvl="1"/>
-            <a:r>
-              <a:rPr lang="en-US" dirty="0"/>
+            <a:pPr lvl="1">
+              <a:lnSpc>
+                <a:spcPct val="100000"/>
+              </a:lnSpc>
+            </a:pPr>
+            <a:r>
+              <a:rPr lang="en-US" sz="1500" dirty="0"/>
               <a:t>Requires a Step-By-Step approach. </a:t>
             </a:r>
           </a:p>
           <a:p>
-            <a:pPr lvl="1"/>
-            <a:r>
-              <a:rPr lang="en-US" dirty="0"/>
+            <a:pPr lvl="1">
+              <a:lnSpc>
+                <a:spcPct val="100000"/>
+              </a:lnSpc>
+            </a:pPr>
+            <a:r>
+              <a:rPr lang="en-US" sz="1500" dirty="0"/>
               <a:t>Low depth limit. </a:t>
             </a:r>
           </a:p>
           <a:p>
-            <a:r>
-              <a:rPr lang="en-US" dirty="0">
-                <a:solidFill>
-                  <a:srgbClr val="000000"/>
-                </a:solidFill>
-              </a:rPr>
+            <a:pPr>
+              <a:lnSpc>
+                <a:spcPct val="100000"/>
+              </a:lnSpc>
+            </a:pPr>
+            <a:r>
+              <a:rPr lang="en-US" sz="1500" dirty="0"/>
               <a:t>Assumed Theoretical Control to be able to model multiplayer games. </a:t>
             </a:r>
           </a:p>
           <a:p>
-            <a:r>
-              <a:rPr lang="en-US" i="0" u="none" strike="noStrike" dirty="0">
-                <a:solidFill>
-                  <a:srgbClr val="000000"/>
-                </a:solidFill>
+            <a:pPr>
+              <a:lnSpc>
+                <a:spcPct val="100000"/>
+              </a:lnSpc>
+            </a:pPr>
+            <a:r>
+              <a:rPr lang="en-US" sz="1500" i="0" u="none" strike="noStrike" dirty="0">
                 <a:effectLst/>
               </a:rPr>
               <a:t>Approach:</a:t>
             </a:r>
           </a:p>
           <a:p>
-            <a:pPr lvl="1"/>
-            <a:r>
-              <a:rPr lang="en-US" dirty="0">
-                <a:solidFill>
-                  <a:srgbClr val="000000"/>
-                </a:solidFill>
-              </a:rPr>
-              <a:t>Take a snapshot of the game state, including hand, available mana, owned creatures, opposing creatures.</a:t>
-            </a:r>
-          </a:p>
-          <a:p>
-            <a:pPr lvl="1"/>
-            <a:r>
-              <a:rPr lang="en-US" dirty="0">
-                <a:solidFill>
-                  <a:srgbClr val="000000"/>
-                </a:solidFill>
-              </a:rPr>
+            <a:pPr lvl="1">
+              <a:lnSpc>
+                <a:spcPct val="100000"/>
+              </a:lnSpc>
+            </a:pPr>
+            <a:r>
+              <a:rPr lang="en-US" sz="1500" dirty="0"/>
+              <a:t>Take a snapshot of the game state.</a:t>
+            </a:r>
+          </a:p>
+          <a:p>
+            <a:pPr lvl="1">
+              <a:lnSpc>
+                <a:spcPct val="100000"/>
+              </a:lnSpc>
+            </a:pPr>
+            <a:r>
+              <a:rPr lang="en-US" sz="1500" dirty="0"/>
               <a:t>Run planning algorithm using that snapshot. </a:t>
             </a:r>
           </a:p>
           <a:p>
-            <a:pPr lvl="1"/>
-            <a:r>
-              <a:rPr lang="en-US" i="0" u="none" strike="noStrike" dirty="0">
-                <a:solidFill>
-                  <a:srgbClr val="000000"/>
-                </a:solidFill>
+            <a:pPr lvl="1">
+              <a:lnSpc>
+                <a:spcPct val="100000"/>
+              </a:lnSpc>
+            </a:pPr>
+            <a:r>
+              <a:rPr lang="en-US" sz="1500" i="0" u="none" strike="noStrike" dirty="0">
                 <a:effectLst/>
               </a:rPr>
               <a:t>For the next turn, </a:t>
             </a:r>
             <a:r>
-              <a:rPr lang="en-US" dirty="0">
-                <a:solidFill>
-                  <a:srgbClr val="000000"/>
-                </a:solidFill>
-              </a:rPr>
+              <a:rPr lang="en-US" sz="1500" dirty="0"/>
               <a:t>repeat. </a:t>
             </a:r>
-            <a:endParaRPr lang="en-US" i="0" u="none" strike="noStrike" dirty="0">
-              <a:solidFill>
-                <a:srgbClr val="000000"/>
-              </a:solidFill>
+            <a:endParaRPr lang="en-US" sz="1500" i="0" u="none" strike="noStrike" dirty="0">
               <a:effectLst/>
             </a:endParaRPr>
           </a:p>
           <a:p>
             <a:pPr marL="324000" lvl="1" indent="0">
+              <a:lnSpc>
+                <a:spcPct val="100000"/>
+              </a:lnSpc>
               <a:buNone/>
             </a:pPr>
-            <a:endParaRPr lang="en-US" i="0" u="none" strike="noStrike" dirty="0">
-              <a:solidFill>
-                <a:srgbClr val="000000"/>
-              </a:solidFill>
+            <a:endParaRPr lang="en-US" sz="1500" i="0" u="none" strike="noStrike" dirty="0">
               <a:effectLst/>
             </a:endParaRPr>
           </a:p>
@@ -4918,6 +5613,14 @@
 <file path=ppt/slides/slide4.xml><?xml version="1.0" encoding="utf-8"?>
 <p:sld xmlns:a="http://schemas.openxmlformats.org/drawingml/2006/main" xmlns:r="http://schemas.openxmlformats.org/officeDocument/2006/relationships" xmlns:p="http://schemas.openxmlformats.org/presentationml/2006/main">
   <p:cSld>
+    <p:bg>
+      <p:bgPr>
+        <a:solidFill>
+          <a:schemeClr val="bg1"/>
+        </a:solidFill>
+        <a:effectLst/>
+      </p:bgPr>
+    </p:bg>
     <p:spTree>
       <p:nvGrpSpPr>
         <p:cNvPr id="1" name=""/>
@@ -4932,6 +5635,254 @@
           <a:chExt cx="0" cy="0"/>
         </a:xfrm>
       </p:grpSpPr>
+      <p:pic>
+        <p:nvPicPr>
+          <p:cNvPr id="6" name="Picture 5">
+            <a:extLst>
+              <a:ext uri="{FF2B5EF4-FFF2-40B4-BE49-F238E27FC236}">
+                <a16:creationId xmlns:a16="http://schemas.microsoft.com/office/drawing/2014/main" id="{CDE92A7B-A891-E0C0-312B-742244F1FB45}"/>
+              </a:ext>
+            </a:extLst>
+          </p:cNvPr>
+          <p:cNvPicPr>
+            <a:picLocks noChangeAspect="1"/>
+          </p:cNvPicPr>
+          <p:nvPr/>
+        </p:nvPicPr>
+        <p:blipFill rotWithShape="1">
+          <a:blip r:embed="rId2"/>
+          <a:srcRect t="6144" r="3" b="22848"/>
+          <a:stretch/>
+        </p:blipFill>
+        <p:spPr>
+          <a:xfrm>
+            <a:off x="-2" y="10"/>
+            <a:ext cx="4578272" cy="2608947"/>
+          </a:xfrm>
+          <a:prstGeom prst="rect">
+            <a:avLst/>
+          </a:prstGeom>
+        </p:spPr>
+      </p:pic>
+      <p:pic>
+        <p:nvPicPr>
+          <p:cNvPr id="8" name="Picture 7" descr="A game card with text and a circle with colored balls&#10;&#10;Description automatically generated with medium confidence">
+            <a:extLst>
+              <a:ext uri="{FF2B5EF4-FFF2-40B4-BE49-F238E27FC236}">
+                <a16:creationId xmlns:a16="http://schemas.microsoft.com/office/drawing/2014/main" id="{706ACACC-7547-795A-B0FD-86F75AE3836B}"/>
+              </a:ext>
+            </a:extLst>
+          </p:cNvPr>
+          <p:cNvPicPr>
+            <a:picLocks noChangeAspect="1"/>
+          </p:cNvPicPr>
+          <p:nvPr/>
+        </p:nvPicPr>
+        <p:blipFill rotWithShape="1">
+          <a:blip r:embed="rId3">
+            <a:extLst>
+              <a:ext uri="{28A0092B-C50C-407E-A947-70E740481C1C}">
+                <a14:useLocalDpi xmlns:a14="http://schemas.microsoft.com/office/drawing/2010/main" val="0"/>
+              </a:ext>
+            </a:extLst>
+          </a:blip>
+          <a:srcRect t="14766" r="-2" b="18535"/>
+          <a:stretch/>
+        </p:blipFill>
+        <p:spPr>
+          <a:xfrm>
+            <a:off x="2" y="2608956"/>
+            <a:ext cx="4560199" cy="4249043"/>
+          </a:xfrm>
+          <a:prstGeom prst="rect">
+            <a:avLst/>
+          </a:prstGeom>
+        </p:spPr>
+      </p:pic>
+      <p:sp>
+        <p:nvSpPr>
+          <p:cNvPr id="13" name="Rectangle 12">
+            <a:extLst>
+              <a:ext uri="{FF2B5EF4-FFF2-40B4-BE49-F238E27FC236}">
+                <a16:creationId xmlns:a16="http://schemas.microsoft.com/office/drawing/2014/main" id="{7B34D440-E359-4CB9-B8E8-81977A860306}"/>
+              </a:ext>
+              <a:ext uri="{C183D7F6-B498-43B3-948B-1728B52AA6E4}">
+                <adec:decorative xmlns:adec="http://schemas.microsoft.com/office/drawing/2017/decorative" val="1"/>
+              </a:ext>
+            </a:extLst>
+          </p:cNvPr>
+          <p:cNvSpPr>
+            <a:spLocks noGrp="1" noRot="1" noChangeAspect="1" noMove="1" noResize="1" noEditPoints="1" noAdjustHandles="1" noChangeArrowheads="1" noChangeShapeType="1" noTextEdit="1"/>
+          </p:cNvSpPr>
+          <p:nvPr>
+            <p:extLst>
+              <p:ext uri="{386F3935-93C4-4BCD-93E2-E3B085C9AB24}">
+                <p16:designElem xmlns:p16="http://schemas.microsoft.com/office/powerpoint/2015/main" val="1"/>
+              </p:ext>
+            </p:extLst>
+          </p:nvPr>
+        </p:nvSpPr>
+        <p:spPr>
+          <a:xfrm>
+            <a:off x="4530517" y="-460"/>
+            <a:ext cx="91440" cy="6858000"/>
+          </a:xfrm>
+          <a:prstGeom prst="rect">
+            <a:avLst/>
+          </a:prstGeom>
+          <a:solidFill>
+            <a:srgbClr val="FFFFFF"/>
+          </a:solidFill>
+          <a:ln>
+            <a:noFill/>
+          </a:ln>
+          <a:effectLst/>
+        </p:spPr>
+        <p:style>
+          <a:lnRef idx="1">
+            <a:schemeClr val="accent1"/>
+          </a:lnRef>
+          <a:fillRef idx="3">
+            <a:schemeClr val="accent1"/>
+          </a:fillRef>
+          <a:effectRef idx="2">
+            <a:schemeClr val="accent1"/>
+          </a:effectRef>
+          <a:fontRef idx="minor">
+            <a:schemeClr val="lt1"/>
+          </a:fontRef>
+        </p:style>
+        <p:txBody>
+          <a:bodyPr rtlCol="0" anchor="ctr"/>
+          <a:lstStyle/>
+          <a:p>
+            <a:pPr algn="ctr"/>
+            <a:endParaRPr lang="en-US"/>
+          </a:p>
+        </p:txBody>
+      </p:sp>
+      <p:sp>
+        <p:nvSpPr>
+          <p:cNvPr id="15" name="Rectangle 14">
+            <a:extLst>
+              <a:ext uri="{FF2B5EF4-FFF2-40B4-BE49-F238E27FC236}">
+                <a16:creationId xmlns:a16="http://schemas.microsoft.com/office/drawing/2014/main" id="{1B8F5A0E-5428-4604-A0F3-2224BE8709A1}"/>
+              </a:ext>
+              <a:ext uri="{C183D7F6-B498-43B3-948B-1728B52AA6E4}">
+                <adec:decorative xmlns:adec="http://schemas.microsoft.com/office/drawing/2017/decorative" val="1"/>
+              </a:ext>
+            </a:extLst>
+          </p:cNvPr>
+          <p:cNvSpPr>
+            <a:spLocks noGrp="1" noRot="1" noChangeAspect="1" noMove="1" noResize="1" noEditPoints="1" noAdjustHandles="1" noChangeArrowheads="1" noChangeShapeType="1" noTextEdit="1"/>
+          </p:cNvSpPr>
+          <p:nvPr>
+            <p:extLst>
+              <p:ext uri="{386F3935-93C4-4BCD-93E2-E3B085C9AB24}">
+                <p16:designElem xmlns:p16="http://schemas.microsoft.com/office/powerpoint/2015/main" val="1"/>
+              </p:ext>
+            </p:extLst>
+          </p:nvPr>
+        </p:nvSpPr>
+        <p:spPr>
+          <a:xfrm>
+            <a:off x="-139" y="2560620"/>
+            <a:ext cx="4581144" cy="91440"/>
+          </a:xfrm>
+          <a:prstGeom prst="rect">
+            <a:avLst/>
+          </a:prstGeom>
+          <a:solidFill>
+            <a:srgbClr val="FFFFFF"/>
+          </a:solidFill>
+          <a:ln>
+            <a:noFill/>
+          </a:ln>
+          <a:effectLst/>
+        </p:spPr>
+        <p:style>
+          <a:lnRef idx="1">
+            <a:schemeClr val="accent1"/>
+          </a:lnRef>
+          <a:fillRef idx="3">
+            <a:schemeClr val="accent1"/>
+          </a:fillRef>
+          <a:effectRef idx="2">
+            <a:schemeClr val="accent1"/>
+          </a:effectRef>
+          <a:fontRef idx="minor">
+            <a:schemeClr val="lt1"/>
+          </a:fontRef>
+        </p:style>
+        <p:txBody>
+          <a:bodyPr/>
+          <a:lstStyle/>
+          <a:p>
+            <a:endParaRPr lang="en-CA"/>
+          </a:p>
+        </p:txBody>
+      </p:sp>
+      <p:sp>
+        <p:nvSpPr>
+          <p:cNvPr id="17" name="Rectangle 16">
+            <a:extLst>
+              <a:ext uri="{FF2B5EF4-FFF2-40B4-BE49-F238E27FC236}">
+                <a16:creationId xmlns:a16="http://schemas.microsoft.com/office/drawing/2014/main" id="{D288FC14-B788-4FBC-9C5E-BC4892F579B0}"/>
+              </a:ext>
+              <a:ext uri="{C183D7F6-B498-43B3-948B-1728B52AA6E4}">
+                <adec:decorative xmlns:adec="http://schemas.microsoft.com/office/drawing/2017/decorative" val="1"/>
+              </a:ext>
+            </a:extLst>
+          </p:cNvPr>
+          <p:cNvSpPr>
+            <a:spLocks noGrp="1" noRot="1" noChangeAspect="1" noMove="1" noResize="1" noEditPoints="1" noAdjustHandles="1" noChangeArrowheads="1" noChangeShapeType="1" noTextEdit="1"/>
+          </p:cNvSpPr>
+          <p:nvPr>
+            <p:extLst>
+              <p:ext uri="{386F3935-93C4-4BCD-93E2-E3B085C9AB24}">
+                <p16:designElem xmlns:p16="http://schemas.microsoft.com/office/powerpoint/2015/main" val="1"/>
+              </p:ext>
+            </p:extLst>
+          </p:nvPr>
+        </p:nvSpPr>
+        <p:spPr>
+          <a:xfrm>
+            <a:off x="4620506" y="0"/>
+            <a:ext cx="7571045" cy="6858000"/>
+          </a:xfrm>
+          <a:prstGeom prst="rect">
+            <a:avLst/>
+          </a:prstGeom>
+          <a:solidFill>
+            <a:srgbClr val="465359"/>
+          </a:solidFill>
+          <a:ln w="6350" cmpd="sng">
+            <a:noFill/>
+          </a:ln>
+          <a:effectLst/>
+        </p:spPr>
+        <p:style>
+          <a:lnRef idx="1">
+            <a:schemeClr val="accent1"/>
+          </a:lnRef>
+          <a:fillRef idx="3">
+            <a:schemeClr val="accent1"/>
+          </a:fillRef>
+          <a:effectRef idx="2">
+            <a:schemeClr val="accent1"/>
+          </a:effectRef>
+          <a:fontRef idx="minor">
+            <a:schemeClr val="lt1"/>
+          </a:fontRef>
+        </p:style>
+        <p:txBody>
+          <a:bodyPr/>
+          <a:lstStyle/>
+          <a:p>
+            <a:endParaRPr lang="en-CA"/>
+          </a:p>
+        </p:txBody>
+      </p:sp>
       <p:sp>
         <p:nvSpPr>
           <p:cNvPr id="2" name="Title 1">
@@ -4948,16 +5899,31 @@
             <p:ph type="title"/>
           </p:nvPr>
         </p:nvSpPr>
-        <p:spPr/>
-        <p:txBody>
-          <a:bodyPr/>
-          <a:lstStyle/>
-          <a:p>
-            <a:r>
-              <a:rPr lang="en-US" dirty="0"/>
+        <p:spPr>
+          <a:xfrm>
+            <a:off x="5204707" y="457280"/>
+            <a:ext cx="6400367" cy="1431399"/>
+          </a:xfrm>
+        </p:spPr>
+        <p:txBody>
+          <a:bodyPr anchor="ctr">
+            <a:normAutofit/>
+          </a:bodyPr>
+          <a:lstStyle/>
+          <a:p>
+            <a:r>
+              <a:rPr lang="en-US">
+                <a:solidFill>
+                  <a:srgbClr val="FFFFFF"/>
+                </a:solidFill>
+              </a:rPr>
               <a:t>Probabilistic Inference – Probability To Win</a:t>
             </a:r>
-            <a:endParaRPr lang="en-CA" dirty="0"/>
+            <a:endParaRPr lang="en-CA">
+              <a:solidFill>
+                <a:srgbClr val="FFFFFF"/>
+              </a:solidFill>
+            </a:endParaRPr>
           </a:p>
         </p:txBody>
       </p:sp>
@@ -4977,39 +5943,70 @@
             <p:ph idx="1"/>
           </p:nvPr>
         </p:nvSpPr>
-        <p:spPr/>
-        <p:txBody>
-          <a:bodyPr/>
-          <a:lstStyle/>
-          <a:p>
-            <a:r>
-              <a:rPr lang="en-US" dirty="0"/>
+        <p:spPr>
+          <a:xfrm>
+            <a:off x="5207590" y="2194527"/>
+            <a:ext cx="6397545" cy="4061676"/>
+          </a:xfrm>
+        </p:spPr>
+        <p:txBody>
+          <a:bodyPr>
+            <a:normAutofit/>
+          </a:bodyPr>
+          <a:lstStyle/>
+          <a:p>
+            <a:r>
+              <a:rPr lang="en-US">
+                <a:solidFill>
+                  <a:srgbClr val="FFFFFF"/>
+                </a:solidFill>
+              </a:rPr>
               <a:t>From any given state, how likely am I to win? </a:t>
             </a:r>
           </a:p>
           <a:p>
             <a:r>
-              <a:rPr lang="en-US" dirty="0"/>
+              <a:rPr lang="en-US">
+                <a:solidFill>
+                  <a:srgbClr val="FFFFFF"/>
+                </a:solidFill>
+              </a:rPr>
               <a:t>Variables will be gathered from looking at previous tournament play games to find what states lead to wins. </a:t>
             </a:r>
-            <a:endParaRPr lang="en-CA" dirty="0"/>
-          </a:p>
-          <a:p>
-            <a:r>
-              <a:rPr lang="en-CA" dirty="0"/>
+            <a:endParaRPr lang="en-CA">
+              <a:solidFill>
+                <a:srgbClr val="FFFFFF"/>
+              </a:solidFill>
+            </a:endParaRPr>
+          </a:p>
+          <a:p>
+            <a:r>
+              <a:rPr lang="en-CA">
+                <a:solidFill>
+                  <a:srgbClr val="FFFFFF"/>
+                </a:solidFill>
+              </a:rPr>
               <a:t>Could be used as a heuristic for the planning algorithm. </a:t>
             </a:r>
           </a:p>
           <a:p>
             <a:r>
-              <a:rPr lang="en-CA" dirty="0"/>
+              <a:rPr lang="en-CA">
+                <a:solidFill>
+                  <a:srgbClr val="FFFFFF"/>
+                </a:solidFill>
+              </a:rPr>
               <a:t>Answers Key Questions:</a:t>
             </a:r>
           </a:p>
           <a:p>
             <a:pPr lvl="1"/>
             <a:r>
-              <a:rPr lang="en-CA" dirty="0"/>
+              <a:rPr lang="en-CA">
+                <a:solidFill>
+                  <a:srgbClr val="FFFFFF"/>
+                </a:solidFill>
+              </a:rPr>
               <a:t>What is the most important factor to winning. </a:t>
             </a:r>
           </a:p>
@@ -5023,7 +6020,7 @@
     </p:extLst>
   </p:cSld>
   <p:clrMapOvr>
-    <a:masterClrMapping/>
+    <a:overrideClrMapping bg1="dk1" tx1="lt1" bg2="dk2" tx2="lt2" accent1="accent1" accent2="accent2" accent3="accent3" accent4="accent4" accent5="accent5" accent6="accent6" hlink="hlink" folHlink="folHlink"/>
   </p:clrMapOvr>
 </p:sld>
 </file>
@@ -5031,6 +6028,14 @@
 <file path=ppt/slides/slide5.xml><?xml version="1.0" encoding="utf-8"?>
 <p:sld xmlns:a="http://schemas.openxmlformats.org/drawingml/2006/main" xmlns:r="http://schemas.openxmlformats.org/officeDocument/2006/relationships" xmlns:p="http://schemas.openxmlformats.org/presentationml/2006/main">
   <p:cSld>
+    <p:bg>
+      <p:bgPr>
+        <a:solidFill>
+          <a:schemeClr val="bg1"/>
+        </a:solidFill>
+        <a:effectLst/>
+      </p:bgPr>
+    </p:bg>
     <p:spTree>
       <p:nvGrpSpPr>
         <p:cNvPr id="1" name=""/>
@@ -5045,6 +6050,66 @@
           <a:chExt cx="0" cy="0"/>
         </a:xfrm>
       </p:grpSpPr>
+      <p:sp useBgFill="1">
+        <p:nvSpPr>
+          <p:cNvPr id="21" name="Rectangle 20">
+            <a:extLst>
+              <a:ext uri="{FF2B5EF4-FFF2-40B4-BE49-F238E27FC236}">
+                <a16:creationId xmlns:a16="http://schemas.microsoft.com/office/drawing/2014/main" id="{F875149D-F692-45DA-8324-D5E0193D5FC4}"/>
+              </a:ext>
+              <a:ext uri="{C183D7F6-B498-43B3-948B-1728B52AA6E4}">
+                <adec:decorative xmlns:adec="http://schemas.microsoft.com/office/drawing/2017/decorative" val="1"/>
+              </a:ext>
+            </a:extLst>
+          </p:cNvPr>
+          <p:cNvSpPr>
+            <a:spLocks noGrp="1" noRot="1" noChangeAspect="1" noMove="1" noResize="1" noEditPoints="1" noAdjustHandles="1" noChangeArrowheads="1" noChangeShapeType="1" noTextEdit="1"/>
+          </p:cNvSpPr>
+          <p:nvPr>
+            <p:extLst>
+              <p:ext uri="{386F3935-93C4-4BCD-93E2-E3B085C9AB24}">
+                <p16:designElem xmlns:p16="http://schemas.microsoft.com/office/powerpoint/2015/main" val="1"/>
+              </p:ext>
+            </p:extLst>
+          </p:nvPr>
+        </p:nvSpPr>
+        <p:spPr>
+          <a:xfrm>
+            <a:off x="0" y="0"/>
+            <a:ext cx="12191999" cy="6858001"/>
+          </a:xfrm>
+          <a:prstGeom prst="rect">
+            <a:avLst/>
+          </a:prstGeom>
+          <a:ln>
+            <a:noFill/>
+          </a:ln>
+        </p:spPr>
+        <p:style>
+          <a:lnRef idx="2">
+            <a:schemeClr val="accent1">
+              <a:shade val="50000"/>
+            </a:schemeClr>
+          </a:lnRef>
+          <a:fillRef idx="1">
+            <a:schemeClr val="accent1"/>
+          </a:fillRef>
+          <a:effectRef idx="0">
+            <a:schemeClr val="accent1"/>
+          </a:effectRef>
+          <a:fontRef idx="minor">
+            <a:schemeClr val="lt1"/>
+          </a:fontRef>
+        </p:style>
+        <p:txBody>
+          <a:bodyPr rtlCol="0" anchor="ctr"/>
+          <a:lstStyle/>
+          <a:p>
+            <a:pPr algn="ctr"/>
+            <a:endParaRPr lang="en-US"/>
+          </a:p>
+        </p:txBody>
+      </p:sp>
       <p:sp>
         <p:nvSpPr>
           <p:cNvPr id="2" name="Title 1">
@@ -5061,16 +6126,206 @@
             <p:ph type="title"/>
           </p:nvPr>
         </p:nvSpPr>
-        <p:spPr/>
+        <p:spPr>
+          <a:xfrm>
+            <a:off x="581192" y="800930"/>
+            <a:ext cx="3568661" cy="2256390"/>
+          </a:xfrm>
+        </p:spPr>
+        <p:txBody>
+          <a:bodyPr anchor="ctr">
+            <a:normAutofit/>
+          </a:bodyPr>
+          <a:lstStyle/>
+          <a:p>
+            <a:r>
+              <a:rPr lang="en-US"/>
+              <a:t>Deep Learning – Salt Score Analyzing</a:t>
+            </a:r>
+            <a:endParaRPr lang="en-CA"/>
+          </a:p>
+        </p:txBody>
+      </p:sp>
+      <p:sp>
+        <p:nvSpPr>
+          <p:cNvPr id="23" name="Rectangle 22">
+            <a:extLst>
+              <a:ext uri="{FF2B5EF4-FFF2-40B4-BE49-F238E27FC236}">
+                <a16:creationId xmlns:a16="http://schemas.microsoft.com/office/drawing/2014/main" id="{C0B19935-C760-4698-9DD1-973C8A428D26}"/>
+              </a:ext>
+              <a:ext uri="{C183D7F6-B498-43B3-948B-1728B52AA6E4}">
+                <adec:decorative xmlns:adec="http://schemas.microsoft.com/office/drawing/2017/decorative" val="1"/>
+              </a:ext>
+            </a:extLst>
+          </p:cNvPr>
+          <p:cNvSpPr>
+            <a:spLocks noGrp="1" noRot="1" noChangeAspect="1" noMove="1" noResize="1" noEditPoints="1" noAdjustHandles="1" noChangeArrowheads="1" noChangeShapeType="1" noTextEdit="1"/>
+          </p:cNvSpPr>
+          <p:nvPr>
+            <p:extLst>
+              <p:ext uri="{386F3935-93C4-4BCD-93E2-E3B085C9AB24}">
+                <p16:designElem xmlns:p16="http://schemas.microsoft.com/office/powerpoint/2015/main" val="1"/>
+              </p:ext>
+            </p:extLst>
+          </p:nvPr>
+        </p:nvSpPr>
+        <p:spPr>
+          <a:xfrm>
+            <a:off x="446534" y="457200"/>
+            <a:ext cx="3703320" cy="94997"/>
+          </a:xfrm>
+          <a:prstGeom prst="rect">
+            <a:avLst/>
+          </a:prstGeom>
+          <a:solidFill>
+            <a:srgbClr val="465359"/>
+          </a:solidFill>
+          <a:ln>
+            <a:noFill/>
+          </a:ln>
+          <a:effectLst/>
+        </p:spPr>
+        <p:style>
+          <a:lnRef idx="1">
+            <a:schemeClr val="accent1"/>
+          </a:lnRef>
+          <a:fillRef idx="3">
+            <a:schemeClr val="accent1"/>
+          </a:fillRef>
+          <a:effectRef idx="2">
+            <a:schemeClr val="accent1"/>
+          </a:effectRef>
+          <a:fontRef idx="minor">
+            <a:schemeClr val="lt1"/>
+          </a:fontRef>
+        </p:style>
         <p:txBody>
           <a:bodyPr/>
           <a:lstStyle/>
           <a:p>
-            <a:r>
-              <a:rPr lang="en-US" dirty="0"/>
-              <a:t>Deep Learning – Salt Score Analyzing</a:t>
-            </a:r>
-            <a:endParaRPr lang="en-CA" dirty="0"/>
+            <a:endParaRPr lang="en-CA"/>
+          </a:p>
+        </p:txBody>
+      </p:sp>
+      <p:sp>
+        <p:nvSpPr>
+          <p:cNvPr id="25" name="Rectangle 24">
+            <a:extLst>
+              <a:ext uri="{FF2B5EF4-FFF2-40B4-BE49-F238E27FC236}">
+                <a16:creationId xmlns:a16="http://schemas.microsoft.com/office/drawing/2014/main" id="{08990612-E008-4F02-AEBB-B140BE753558}"/>
+              </a:ext>
+              <a:ext uri="{C183D7F6-B498-43B3-948B-1728B52AA6E4}">
+                <adec:decorative xmlns:adec="http://schemas.microsoft.com/office/drawing/2017/decorative" val="1"/>
+              </a:ext>
+            </a:extLst>
+          </p:cNvPr>
+          <p:cNvSpPr>
+            <a:spLocks noGrp="1" noRot="1" noChangeAspect="1" noMove="1" noResize="1" noEditPoints="1" noAdjustHandles="1" noChangeArrowheads="1" noChangeShapeType="1" noTextEdit="1"/>
+          </p:cNvSpPr>
+          <p:nvPr>
+            <p:extLst>
+              <p:ext uri="{386F3935-93C4-4BCD-93E2-E3B085C9AB24}">
+                <p16:designElem xmlns:p16="http://schemas.microsoft.com/office/powerpoint/2015/main" val="1"/>
+              </p:ext>
+            </p:extLst>
+          </p:nvPr>
+        </p:nvSpPr>
+        <p:spPr>
+          <a:xfrm>
+            <a:off x="4241830" y="457200"/>
+            <a:ext cx="3703320" cy="91440"/>
+          </a:xfrm>
+          <a:prstGeom prst="rect">
+            <a:avLst/>
+          </a:prstGeom>
+          <a:solidFill>
+            <a:schemeClr val="accent1"/>
+          </a:solidFill>
+          <a:ln>
+            <a:noFill/>
+          </a:ln>
+          <a:effectLst/>
+        </p:spPr>
+        <p:style>
+          <a:lnRef idx="1">
+            <a:schemeClr val="accent1"/>
+          </a:lnRef>
+          <a:fillRef idx="3">
+            <a:schemeClr val="accent1"/>
+          </a:fillRef>
+          <a:effectRef idx="2">
+            <a:schemeClr val="accent1"/>
+          </a:effectRef>
+          <a:fontRef idx="minor">
+            <a:schemeClr val="lt1"/>
+          </a:fontRef>
+        </p:style>
+        <p:txBody>
+          <a:bodyPr/>
+          <a:lstStyle/>
+          <a:p>
+            <a:endParaRPr lang="en-CA"/>
+          </a:p>
+        </p:txBody>
+      </p:sp>
+      <p:sp>
+        <p:nvSpPr>
+          <p:cNvPr id="27" name="Rectangle 26">
+            <a:extLst>
+              <a:ext uri="{FF2B5EF4-FFF2-40B4-BE49-F238E27FC236}">
+                <a16:creationId xmlns:a16="http://schemas.microsoft.com/office/drawing/2014/main" id="{A310A41F-3A14-4150-B6CF-0A577DDDEAD2}"/>
+              </a:ext>
+              <a:ext uri="{C183D7F6-B498-43B3-948B-1728B52AA6E4}">
+                <adec:decorative xmlns:adec="http://schemas.microsoft.com/office/drawing/2017/decorative" val="1"/>
+              </a:ext>
+            </a:extLst>
+          </p:cNvPr>
+          <p:cNvSpPr>
+            <a:spLocks noGrp="1" noRot="1" noChangeAspect="1" noMove="1" noResize="1" noEditPoints="1" noAdjustHandles="1" noChangeArrowheads="1" noChangeShapeType="1" noTextEdit="1"/>
+          </p:cNvSpPr>
+          <p:nvPr>
+            <p:extLst>
+              <p:ext uri="{386F3935-93C4-4BCD-93E2-E3B085C9AB24}">
+                <p16:designElem xmlns:p16="http://schemas.microsoft.com/office/powerpoint/2015/main" val="1"/>
+              </p:ext>
+            </p:extLst>
+          </p:nvPr>
+        </p:nvSpPr>
+        <p:spPr>
+          <a:xfrm>
+            <a:off x="8042147" y="453643"/>
+            <a:ext cx="3703320" cy="98554"/>
+          </a:xfrm>
+          <a:prstGeom prst="rect">
+            <a:avLst/>
+          </a:prstGeom>
+          <a:solidFill>
+            <a:srgbClr val="969FA7"/>
+          </a:solidFill>
+          <a:ln>
+            <a:noFill/>
+          </a:ln>
+          <a:effectLst/>
+        </p:spPr>
+        <p:style>
+          <a:lnRef idx="1">
+            <a:schemeClr val="accent1"/>
+          </a:lnRef>
+          <a:fillRef idx="3">
+            <a:schemeClr val="accent1"/>
+          </a:fillRef>
+          <a:effectRef idx="2">
+            <a:schemeClr val="accent1"/>
+          </a:effectRef>
+          <a:fontRef idx="minor">
+            <a:schemeClr val="lt1"/>
+          </a:fontRef>
+        </p:style>
+        <p:txBody>
+          <a:bodyPr/>
+          <a:lstStyle/>
+          <a:p>
+            <a:endParaRPr lang="en-CA"/>
           </a:p>
         </p:txBody>
       </p:sp>
@@ -5092,90 +6347,197 @@
         </p:nvSpPr>
         <p:spPr>
           <a:xfrm>
-            <a:off x="581193" y="2340864"/>
-            <a:ext cx="6596356" cy="3634486"/>
+            <a:off x="4561870" y="800930"/>
+            <a:ext cx="7183597" cy="2482984"/>
           </a:xfrm>
         </p:spPr>
         <p:txBody>
           <a:bodyPr>
-            <a:normAutofit/>
+            <a:normAutofit fontScale="92500" lnSpcReduction="10000"/>
           </a:bodyPr>
           <a:lstStyle/>
           <a:p>
-            <a:r>
-              <a:rPr lang="en-US" sz="1800" i="0" u="none" strike="noStrike" dirty="0">
-                <a:solidFill>
-                  <a:srgbClr val="000000"/>
-                </a:solidFill>
+            <a:pPr>
+              <a:lnSpc>
+                <a:spcPct val="100000"/>
+              </a:lnSpc>
+              <a:buClr>
+                <a:srgbClr val="7FA5BA"/>
+              </a:buClr>
+            </a:pPr>
+            <a:r>
+              <a:rPr lang="en-US" sz="1500" i="0" u="none" strike="noStrike" dirty="0">
                 <a:effectLst/>
               </a:rPr>
               <a:t>Using the variety of information stored on a MTG card, train a deep-learning model to estimate the "salt score" of MTG cards. </a:t>
             </a:r>
           </a:p>
           <a:p>
-            <a:r>
-              <a:rPr lang="en-US" sz="1800" dirty="0">
-                <a:solidFill>
-                  <a:srgbClr val="000000"/>
-                </a:solidFill>
-              </a:rPr>
+            <a:pPr>
+              <a:lnSpc>
+                <a:spcPct val="100000"/>
+              </a:lnSpc>
+              <a:buClr>
+                <a:srgbClr val="7FA5BA"/>
+              </a:buClr>
+            </a:pPr>
+            <a:r>
+              <a:rPr lang="en-US" sz="1500" dirty="0"/>
               <a:t>The community voted</a:t>
             </a:r>
             <a:r>
-              <a:rPr lang="en-US" sz="1800" i="0" u="none" strike="noStrike" dirty="0">
-                <a:solidFill>
-                  <a:srgbClr val="000000"/>
-                </a:solidFill>
+              <a:rPr lang="en-US" sz="1500" i="0" u="none" strike="noStrike" dirty="0">
                 <a:effectLst/>
               </a:rPr>
               <a:t> “How much do I hate playing against this card” value</a:t>
             </a:r>
           </a:p>
           <a:p>
-            <a:r>
-              <a:rPr lang="en-US" sz="1800" i="0" u="none" strike="noStrike" dirty="0">
-                <a:solidFill>
-                  <a:srgbClr val="000000"/>
-                </a:solidFill>
+            <a:pPr>
+              <a:lnSpc>
+                <a:spcPct val="100000"/>
+              </a:lnSpc>
+              <a:buClr>
+                <a:srgbClr val="7FA5BA"/>
+              </a:buClr>
+            </a:pPr>
+            <a:r>
+              <a:rPr lang="en-US" sz="1500" i="0" u="none" strike="noStrike" dirty="0">
                 <a:effectLst/>
               </a:rPr>
               <a:t>Variables will be values on the card, mana cost, text on card, ETC</a:t>
             </a:r>
           </a:p>
           <a:p>
-            <a:r>
-              <a:rPr lang="en-US" sz="1800" dirty="0">
-                <a:solidFill>
-                  <a:srgbClr val="000000"/>
-                </a:solidFill>
-              </a:rPr>
+            <a:pPr>
+              <a:lnSpc>
+                <a:spcPct val="100000"/>
+              </a:lnSpc>
+              <a:buClr>
+                <a:srgbClr val="7FA5BA"/>
+              </a:buClr>
+            </a:pPr>
+            <a:r>
+              <a:rPr lang="en-US" sz="1500" dirty="0"/>
               <a:t>Approach:</a:t>
             </a:r>
           </a:p>
           <a:p>
-            <a:pPr lvl="1"/>
-            <a:r>
-              <a:rPr lang="en-US" dirty="0">
-                <a:solidFill>
-                  <a:srgbClr val="000000"/>
-                </a:solidFill>
-              </a:rPr>
+            <a:pPr lvl="1">
+              <a:lnSpc>
+                <a:spcPct val="100000"/>
+              </a:lnSpc>
+              <a:buClr>
+                <a:srgbClr val="7FA5BA"/>
+              </a:buClr>
+            </a:pPr>
+            <a:r>
+              <a:rPr lang="en-US" sz="1500" dirty="0"/>
               <a:t>Gather required resources, labelled dataset, and a testing dataset,  </a:t>
             </a:r>
           </a:p>
           <a:p>
-            <a:pPr lvl="1"/>
-            <a:r>
-              <a:rPr lang="en-US" dirty="0">
-                <a:solidFill>
-                  <a:srgbClr val="000000"/>
-                </a:solidFill>
-              </a:rPr>
-              <a:t>Use one of the python libraries, to generate the model. </a:t>
-            </a:r>
-          </a:p>
-        </p:txBody>
-      </p:sp>
+            <a:pPr lvl="1">
+              <a:lnSpc>
+                <a:spcPct val="100000"/>
+              </a:lnSpc>
+              <a:buClr>
+                <a:srgbClr val="7FA5BA"/>
+              </a:buClr>
+            </a:pPr>
+            <a:r>
+              <a:rPr lang="en-US" sz="1500" dirty="0"/>
+              <a:t>Use one of the python libraries to generate the model. </a:t>
+            </a:r>
+          </a:p>
+          <a:p>
+            <a:pPr lvl="1">
+              <a:lnSpc>
+                <a:spcPct val="100000"/>
+              </a:lnSpc>
+              <a:buClr>
+                <a:srgbClr val="7FA5BA"/>
+              </a:buClr>
+            </a:pPr>
+            <a:r>
+              <a:rPr lang="en-US" sz="1500" dirty="0"/>
+              <a:t>Run it against testing data to validate performance with new information</a:t>
+            </a:r>
+          </a:p>
+        </p:txBody>
+      </p:sp>
+      <p:pic>
+        <p:nvPicPr>
+          <p:cNvPr id="5" name="Picture 4" descr="A salt shaker with a black background&#10;&#10;Description automatically generated">
+            <a:extLst>
+              <a:ext uri="{FF2B5EF4-FFF2-40B4-BE49-F238E27FC236}">
+                <a16:creationId xmlns:a16="http://schemas.microsoft.com/office/drawing/2014/main" id="{54046808-8619-9CCC-7F92-42B6BBB2FDAB}"/>
+              </a:ext>
+            </a:extLst>
+          </p:cNvPr>
+          <p:cNvPicPr>
+            <a:picLocks noChangeAspect="1"/>
+          </p:cNvPicPr>
+          <p:nvPr/>
+        </p:nvPicPr>
+        <p:blipFill>
+          <a:blip r:embed="rId2">
+            <a:extLst>
+              <a:ext uri="{28A0092B-C50C-407E-A947-70E740481C1C}">
+                <a14:useLocalDpi xmlns:a14="http://schemas.microsoft.com/office/drawing/2010/main" val="0"/>
+              </a:ext>
+            </a:extLst>
+          </a:blip>
+          <a:stretch>
+            <a:fillRect/>
+          </a:stretch>
+        </p:blipFill>
+        <p:spPr>
+          <a:xfrm>
+            <a:off x="842059" y="3116712"/>
+            <a:ext cx="3046926" cy="3046926"/>
+          </a:xfrm>
+          <a:prstGeom prst="rect">
+            <a:avLst/>
+          </a:prstGeom>
+        </p:spPr>
+      </p:pic>
+      <p:pic>
+        <p:nvPicPr>
+          <p:cNvPr id="11" name="Picture 10" descr="A screenshot of a game&#10;&#10;Description automatically generated">
+            <a:extLst>
+              <a:ext uri="{FF2B5EF4-FFF2-40B4-BE49-F238E27FC236}">
+                <a16:creationId xmlns:a16="http://schemas.microsoft.com/office/drawing/2014/main" id="{DAAFE5F0-8323-659E-F4C4-3C444E4F8C82}"/>
+              </a:ext>
+            </a:extLst>
+          </p:cNvPr>
+          <p:cNvPicPr>
+            <a:picLocks noChangeAspect="1"/>
+          </p:cNvPicPr>
+          <p:nvPr/>
+        </p:nvPicPr>
+        <p:blipFill>
+          <a:blip r:embed="rId3">
+            <a:extLst>
+              <a:ext uri="{28A0092B-C50C-407E-A947-70E740481C1C}">
+                <a14:useLocalDpi xmlns:a14="http://schemas.microsoft.com/office/drawing/2010/main" val="0"/>
+              </a:ext>
+            </a:extLst>
+          </a:blip>
+          <a:stretch>
+            <a:fillRect/>
+          </a:stretch>
+        </p:blipFill>
+        <p:spPr>
+          <a:xfrm>
+            <a:off x="4561870" y="3429000"/>
+            <a:ext cx="7341314" cy="2734638"/>
+          </a:xfrm>
+          <a:prstGeom prst="rect">
+            <a:avLst/>
+          </a:prstGeom>
+        </p:spPr>
+      </p:pic>
     </p:spTree>
     <p:extLst>
       <p:ext uri="{BB962C8B-B14F-4D97-AF65-F5344CB8AC3E}">
@@ -5192,6 +6554,14 @@
 <file path=ppt/slides/slide6.xml><?xml version="1.0" encoding="utf-8"?>
 <p:sld xmlns:a="http://schemas.openxmlformats.org/drawingml/2006/main" xmlns:r="http://schemas.openxmlformats.org/officeDocument/2006/relationships" xmlns:p="http://schemas.openxmlformats.org/presentationml/2006/main">
   <p:cSld>
+    <p:bg>
+      <p:bgPr>
+        <a:solidFill>
+          <a:schemeClr val="bg1"/>
+        </a:solidFill>
+        <a:effectLst/>
+      </p:bgPr>
+    </p:bg>
     <p:spTree>
       <p:nvGrpSpPr>
         <p:cNvPr id="1" name=""/>
@@ -5206,6 +6576,66 @@
           <a:chExt cx="0" cy="0"/>
         </a:xfrm>
       </p:grpSpPr>
+      <p:sp useBgFill="1">
+        <p:nvSpPr>
+          <p:cNvPr id="12" name="Rectangle 11">
+            <a:extLst>
+              <a:ext uri="{FF2B5EF4-FFF2-40B4-BE49-F238E27FC236}">
+                <a16:creationId xmlns:a16="http://schemas.microsoft.com/office/drawing/2014/main" id="{504BED40-EAF7-4E55-AFF7-2CD840EBD3AA}"/>
+              </a:ext>
+              <a:ext uri="{C183D7F6-B498-43B3-948B-1728B52AA6E4}">
+                <adec:decorative xmlns:adec="http://schemas.microsoft.com/office/drawing/2017/decorative" val="1"/>
+              </a:ext>
+            </a:extLst>
+          </p:cNvPr>
+          <p:cNvSpPr>
+            <a:spLocks noGrp="1" noRot="1" noChangeAspect="1" noMove="1" noResize="1" noEditPoints="1" noAdjustHandles="1" noChangeArrowheads="1" noChangeShapeType="1" noTextEdit="1"/>
+          </p:cNvSpPr>
+          <p:nvPr>
+            <p:extLst>
+              <p:ext uri="{386F3935-93C4-4BCD-93E2-E3B085C9AB24}">
+                <p16:designElem xmlns:p16="http://schemas.microsoft.com/office/powerpoint/2015/main" val="1"/>
+              </p:ext>
+            </p:extLst>
+          </p:nvPr>
+        </p:nvSpPr>
+        <p:spPr>
+          <a:xfrm>
+            <a:off x="0" y="0"/>
+            <a:ext cx="12192000" cy="6858000"/>
+          </a:xfrm>
+          <a:prstGeom prst="rect">
+            <a:avLst/>
+          </a:prstGeom>
+          <a:ln>
+            <a:noFill/>
+          </a:ln>
+        </p:spPr>
+        <p:style>
+          <a:lnRef idx="2">
+            <a:schemeClr val="accent1">
+              <a:shade val="50000"/>
+            </a:schemeClr>
+          </a:lnRef>
+          <a:fillRef idx="1">
+            <a:schemeClr val="accent1"/>
+          </a:fillRef>
+          <a:effectRef idx="0">
+            <a:schemeClr val="accent1"/>
+          </a:effectRef>
+          <a:fontRef idx="minor">
+            <a:schemeClr val="lt1"/>
+          </a:fontRef>
+        </p:style>
+        <p:txBody>
+          <a:bodyPr rtlCol="0" anchor="ctr"/>
+          <a:lstStyle/>
+          <a:p>
+            <a:pPr algn="ctr"/>
+            <a:endParaRPr lang="en-US"/>
+          </a:p>
+        </p:txBody>
+      </p:sp>
       <p:sp>
         <p:nvSpPr>
           <p:cNvPr id="2" name="Title 1">
@@ -5222,16 +6652,92 @@
             <p:ph type="title"/>
           </p:nvPr>
         </p:nvSpPr>
-        <p:spPr/>
+        <p:spPr>
+          <a:xfrm>
+            <a:off x="581193" y="702156"/>
+            <a:ext cx="6540462" cy="1013800"/>
+          </a:xfrm>
+        </p:spPr>
+        <p:txBody>
+          <a:bodyPr>
+            <a:normAutofit/>
+          </a:bodyPr>
+          <a:lstStyle/>
+          <a:p>
+            <a:r>
+              <a:rPr lang="en-US">
+                <a:solidFill>
+                  <a:schemeClr val="tx2"/>
+                </a:solidFill>
+              </a:rPr>
+              <a:t>Planned Implementation</a:t>
+            </a:r>
+            <a:endParaRPr lang="en-CA">
+              <a:solidFill>
+                <a:schemeClr val="tx2"/>
+              </a:solidFill>
+            </a:endParaRPr>
+          </a:p>
+        </p:txBody>
+      </p:sp>
+      <p:sp>
+        <p:nvSpPr>
+          <p:cNvPr id="14" name="Rectangle 13">
+            <a:extLst>
+              <a:ext uri="{FF2B5EF4-FFF2-40B4-BE49-F238E27FC236}">
+                <a16:creationId xmlns:a16="http://schemas.microsoft.com/office/drawing/2014/main" id="{F367CCF1-BB1E-41CF-8499-94A870C33EFA}"/>
+              </a:ext>
+              <a:ext uri="{C183D7F6-B498-43B3-948B-1728B52AA6E4}">
+                <adec:decorative xmlns:adec="http://schemas.microsoft.com/office/drawing/2017/decorative" val="1"/>
+              </a:ext>
+            </a:extLst>
+          </p:cNvPr>
+          <p:cNvSpPr>
+            <a:spLocks noGrp="1" noRot="1" noChangeAspect="1" noMove="1" noResize="1" noEditPoints="1" noAdjustHandles="1" noChangeArrowheads="1" noChangeShapeType="1" noTextEdit="1"/>
+          </p:cNvSpPr>
+          <p:nvPr>
+            <p:extLst>
+              <p:ext uri="{386F3935-93C4-4BCD-93E2-E3B085C9AB24}">
+                <p16:designElem xmlns:p16="http://schemas.microsoft.com/office/powerpoint/2015/main" val="1"/>
+              </p:ext>
+            </p:extLst>
+          </p:nvPr>
+        </p:nvSpPr>
+        <p:spPr>
+          <a:xfrm>
+            <a:off x="446534" y="457200"/>
+            <a:ext cx="6675120" cy="94997"/>
+          </a:xfrm>
+          <a:prstGeom prst="rect">
+            <a:avLst/>
+          </a:prstGeom>
+          <a:solidFill>
+            <a:schemeClr val="accent1"/>
+          </a:solidFill>
+          <a:ln>
+            <a:noFill/>
+          </a:ln>
+          <a:effectLst/>
+        </p:spPr>
+        <p:style>
+          <a:lnRef idx="1">
+            <a:schemeClr val="accent1"/>
+          </a:lnRef>
+          <a:fillRef idx="3">
+            <a:schemeClr val="accent1"/>
+          </a:fillRef>
+          <a:effectRef idx="2">
+            <a:schemeClr val="accent1"/>
+          </a:effectRef>
+          <a:fontRef idx="minor">
+            <a:schemeClr val="lt1"/>
+          </a:fontRef>
+        </p:style>
         <p:txBody>
           <a:bodyPr/>
           <a:lstStyle/>
           <a:p>
-            <a:r>
-              <a:rPr lang="en-US" dirty="0"/>
-              <a:t>Planned Implementation</a:t>
-            </a:r>
-            <a:endParaRPr lang="en-CA" dirty="0"/>
+            <a:endParaRPr lang="en-CA"/>
           </a:p>
         </p:txBody>
       </p:sp>
@@ -5251,101 +6757,302 @@
             <p:ph idx="1"/>
           </p:nvPr>
         </p:nvSpPr>
-        <p:spPr/>
-        <p:txBody>
-          <a:bodyPr/>
-          <a:lstStyle/>
-          <a:p>
-            <a:r>
-              <a:rPr lang="en-CA" dirty="0"/>
+        <p:spPr>
+          <a:xfrm>
+            <a:off x="581194" y="1896533"/>
+            <a:ext cx="6309003" cy="3962266"/>
+          </a:xfrm>
+        </p:spPr>
+        <p:txBody>
+          <a:bodyPr>
+            <a:normAutofit/>
+          </a:bodyPr>
+          <a:lstStyle/>
+          <a:p>
+            <a:r>
+              <a:rPr lang="en-CA" dirty="0">
+                <a:solidFill>
+                  <a:schemeClr val="tx2"/>
+                </a:solidFill>
+              </a:rPr>
               <a:t>Python For Implementation</a:t>
             </a:r>
           </a:p>
           <a:p>
             <a:pPr lvl="1"/>
             <a:r>
-              <a:rPr lang="en-CA" dirty="0"/>
-              <a:t>PP for Planning. </a:t>
+              <a:rPr lang="en-CA" dirty="0">
+                <a:solidFill>
+                  <a:schemeClr val="tx2"/>
+                </a:solidFill>
+              </a:rPr>
+              <a:t>PDDL for Planning. </a:t>
             </a:r>
           </a:p>
           <a:p>
             <a:pPr lvl="1"/>
             <a:r>
-              <a:rPr lang="en-CA" dirty="0" err="1"/>
+              <a:rPr lang="en-CA" dirty="0" err="1">
+                <a:solidFill>
+                  <a:schemeClr val="tx2"/>
+                </a:solidFill>
+              </a:rPr>
               <a:t>PyTorch</a:t>
             </a:r>
             <a:r>
-              <a:rPr lang="en-CA" dirty="0"/>
+              <a:rPr lang="en-CA" dirty="0">
+                <a:solidFill>
+                  <a:schemeClr val="tx2"/>
+                </a:solidFill>
+              </a:rPr>
               <a:t>, </a:t>
             </a:r>
             <a:r>
-              <a:rPr lang="en-CA" dirty="0" err="1"/>
+              <a:rPr lang="en-CA" dirty="0" err="1">
+                <a:solidFill>
+                  <a:schemeClr val="tx2"/>
+                </a:solidFill>
+              </a:rPr>
               <a:t>Keras</a:t>
             </a:r>
             <a:r>
-              <a:rPr lang="en-CA" dirty="0"/>
+              <a:rPr lang="en-CA" dirty="0">
+                <a:solidFill>
+                  <a:schemeClr val="tx2"/>
+                </a:solidFill>
+              </a:rPr>
               <a:t>, or TensorFlow for Deep learning</a:t>
             </a:r>
           </a:p>
           <a:p>
             <a:pPr lvl="1"/>
             <a:r>
-              <a:rPr lang="en-CA" dirty="0"/>
+              <a:rPr lang="en-CA" dirty="0">
+                <a:solidFill>
+                  <a:schemeClr val="tx2"/>
+                </a:solidFill>
+              </a:rPr>
               <a:t>NumPy or </a:t>
             </a:r>
             <a:r>
               <a:rPr lang="en-CA" b="0" i="0" dirty="0">
                 <a:solidFill>
-                  <a:srgbClr val="1C1C1C"/>
+                  <a:schemeClr val="tx2"/>
                 </a:solidFill>
                 <a:effectLst/>
               </a:rPr>
               <a:t>PyMC3 for probabilistic networks. </a:t>
             </a:r>
-            <a:endParaRPr lang="en-CA" dirty="0"/>
+            <a:endParaRPr lang="en-CA" dirty="0">
+              <a:solidFill>
+                <a:schemeClr val="tx2"/>
+              </a:solidFill>
+            </a:endParaRPr>
           </a:p>
           <a:p>
             <a:pPr lvl="1"/>
             <a:r>
-              <a:rPr lang="en-CA" dirty="0"/>
+              <a:rPr lang="en-CA" dirty="0">
+                <a:solidFill>
+                  <a:schemeClr val="tx2"/>
+                </a:solidFill>
+              </a:rPr>
               <a:t>Universally Required Python Libraries: NumPy, </a:t>
             </a:r>
           </a:p>
           <a:p>
             <a:r>
-              <a:rPr lang="en-CA" dirty="0"/>
+              <a:rPr lang="en-CA" dirty="0">
+                <a:solidFill>
+                  <a:schemeClr val="tx2"/>
+                </a:solidFill>
+              </a:rPr>
               <a:t>Data required: </a:t>
             </a:r>
           </a:p>
           <a:p>
             <a:pPr lvl="1"/>
             <a:r>
-              <a:rPr lang="en-CA" dirty="0"/>
+              <a:rPr lang="en-CA" dirty="0">
+                <a:solidFill>
+                  <a:schemeClr val="tx2"/>
+                </a:solidFill>
+              </a:rPr>
               <a:t>Card data will be gathered for free from the </a:t>
             </a:r>
             <a:r>
-              <a:rPr lang="en-CA" dirty="0" err="1"/>
+              <a:rPr lang="en-CA" dirty="0" err="1">
+                <a:solidFill>
+                  <a:schemeClr val="tx2"/>
+                </a:solidFill>
+              </a:rPr>
               <a:t>Scryfall</a:t>
             </a:r>
             <a:r>
-              <a:rPr lang="en-CA" dirty="0"/>
+              <a:rPr lang="en-CA" dirty="0">
+                <a:solidFill>
+                  <a:schemeClr val="tx2"/>
+                </a:solidFill>
+              </a:rPr>
               <a:t> website as separate JSON files per card, processed in python. </a:t>
             </a:r>
           </a:p>
           <a:p>
             <a:pPr lvl="1"/>
-            <a:endParaRPr lang="en-CA" dirty="0"/>
+            <a:endParaRPr lang="en-CA" dirty="0">
+              <a:solidFill>
+                <a:schemeClr val="tx2"/>
+              </a:solidFill>
+            </a:endParaRPr>
           </a:p>
           <a:p>
             <a:pPr lvl="1"/>
-            <a:endParaRPr lang="en-CA" dirty="0"/>
+            <a:endParaRPr lang="en-CA" dirty="0">
+              <a:solidFill>
+                <a:schemeClr val="tx2"/>
+              </a:solidFill>
+            </a:endParaRPr>
           </a:p>
           <a:p>
             <a:pPr lvl="1"/>
-            <a:endParaRPr lang="en-CA" dirty="0"/>
-          </a:p>
-        </p:txBody>
-      </p:sp>
+            <a:endParaRPr lang="en-CA" dirty="0">
+              <a:solidFill>
+                <a:schemeClr val="tx2"/>
+              </a:solidFill>
+            </a:endParaRPr>
+          </a:p>
+        </p:txBody>
+      </p:sp>
+      <p:pic>
+        <p:nvPicPr>
+          <p:cNvPr id="7" name="Picture 6" descr="A screenshot of a computer&#10;&#10;Description automatically generated">
+            <a:extLst>
+              <a:ext uri="{FF2B5EF4-FFF2-40B4-BE49-F238E27FC236}">
+                <a16:creationId xmlns:a16="http://schemas.microsoft.com/office/drawing/2014/main" id="{AEEA3017-1509-313A-382F-F7F08903009E}"/>
+              </a:ext>
+            </a:extLst>
+          </p:cNvPr>
+          <p:cNvPicPr>
+            <a:picLocks noChangeAspect="1"/>
+          </p:cNvPicPr>
+          <p:nvPr/>
+        </p:nvPicPr>
+        <p:blipFill>
+          <a:blip r:embed="rId2">
+            <a:extLst>
+              <a:ext uri="{28A0092B-C50C-407E-A947-70E740481C1C}">
+                <a14:useLocalDpi xmlns:a14="http://schemas.microsoft.com/office/drawing/2010/main" val="0"/>
+              </a:ext>
+            </a:extLst>
+          </a:blip>
+          <a:stretch>
+            <a:fillRect/>
+          </a:stretch>
+        </p:blipFill>
+        <p:spPr>
+          <a:xfrm>
+            <a:off x="6096000" y="752415"/>
+            <a:ext cx="5388192" cy="2370803"/>
+          </a:xfrm>
+          <a:prstGeom prst="rect">
+            <a:avLst/>
+          </a:prstGeom>
+        </p:spPr>
+      </p:pic>
+      <p:pic>
+        <p:nvPicPr>
+          <p:cNvPr id="1034" name="Picture 10" descr="GitHub - APLA-Toolbox/PythonPDDL: 🧭🔍 A PDDL Planner in Python partially  wrapping PDDL.jl using JuliaPy">
+            <a:extLst>
+              <a:ext uri="{FF2B5EF4-FFF2-40B4-BE49-F238E27FC236}">
+                <a16:creationId xmlns:a16="http://schemas.microsoft.com/office/drawing/2014/main" id="{93979C4B-E887-A5B8-7E2D-372A18B934D4}"/>
+              </a:ext>
+            </a:extLst>
+          </p:cNvPr>
+          <p:cNvPicPr>
+            <a:picLocks noChangeAspect="1" noChangeArrowheads="1"/>
+          </p:cNvPicPr>
+          <p:nvPr/>
+        </p:nvPicPr>
+        <p:blipFill>
+          <a:blip r:embed="rId3">
+            <a:extLst>
+              <a:ext uri="{28A0092B-C50C-407E-A947-70E740481C1C}">
+                <a14:useLocalDpi xmlns:a14="http://schemas.microsoft.com/office/drawing/2010/main" val="0"/>
+              </a:ext>
+            </a:extLst>
+          </a:blip>
+          <a:srcRect/>
+          <a:stretch>
+            <a:fillRect/>
+          </a:stretch>
+        </p:blipFill>
+        <p:spPr bwMode="auto">
+          <a:xfrm>
+            <a:off x="9752908" y="2499524"/>
+            <a:ext cx="2143125" cy="2143125"/>
+          </a:xfrm>
+          <a:prstGeom prst="rect">
+            <a:avLst/>
+          </a:prstGeom>
+          <a:noFill/>
+          <a:extLst>
+            <a:ext uri="{909E8E84-426E-40DD-AFC4-6F175D3DCCD1}">
+              <a14:hiddenFill xmlns:a14="http://schemas.microsoft.com/office/drawing/2010/main">
+                <a:solidFill>
+                  <a:srgbClr val="FFFFFF"/>
+                </a:solidFill>
+              </a14:hiddenFill>
+            </a:ext>
+          </a:extLst>
+        </p:spPr>
+      </p:pic>
+      <p:pic>
+        <p:nvPicPr>
+          <p:cNvPr id="1030" name="Picture 6">
+            <a:extLst>
+              <a:ext uri="{FF2B5EF4-FFF2-40B4-BE49-F238E27FC236}">
+                <a16:creationId xmlns:a16="http://schemas.microsoft.com/office/drawing/2014/main" id="{AABC099B-0E08-9D2E-DE07-9EB90FEAD162}"/>
+              </a:ext>
+            </a:extLst>
+          </p:cNvPr>
+          <p:cNvPicPr>
+            <a:picLocks noChangeAspect="1" noChangeArrowheads="1"/>
+          </p:cNvPicPr>
+          <p:nvPr/>
+        </p:nvPicPr>
+        <p:blipFill>
+          <a:blip r:embed="rId4">
+            <a:extLst>
+              <a:ext uri="{28A0092B-C50C-407E-A947-70E740481C1C}">
+                <a14:useLocalDpi xmlns:a14="http://schemas.microsoft.com/office/drawing/2010/main" val="0"/>
+              </a:ext>
+            </a:extLst>
+          </a:blip>
+          <a:srcRect/>
+          <a:stretch>
+            <a:fillRect/>
+          </a:stretch>
+        </p:blipFill>
+        <p:spPr bwMode="auto">
+          <a:xfrm>
+            <a:off x="7454367" y="3041287"/>
+            <a:ext cx="2922486" cy="3202724"/>
+          </a:xfrm>
+          <a:prstGeom prst="rect">
+            <a:avLst/>
+          </a:prstGeom>
+          <a:noFill/>
+          <a:extLst>
+            <a:ext uri="{909E8E84-426E-40DD-AFC4-6F175D3DCCD1}">
+              <a14:hiddenFill xmlns:a14="http://schemas.microsoft.com/office/drawing/2010/main">
+                <a:solidFill>
+                  <a:srgbClr val="FFFFFF"/>
+                </a:solidFill>
+              </a14:hiddenFill>
+            </a:ext>
+          </a:extLst>
+        </p:spPr>
+      </p:pic>
     </p:spTree>
     <p:extLst>
       <p:ext uri="{BB962C8B-B14F-4D97-AF65-F5344CB8AC3E}">

</xml_diff>